<commit_message>
Update Presentation File to reflect future implications
</commit_message>
<xml_diff>
--- a/Project_1_Presentation.pptx
+++ b/Project_1_Presentation.pptx
@@ -5,7 +5,7 @@
     <p:sldMasterId id="2147483648" r:id="rId4"/>
   </p:sldMasterIdLst>
   <p:notesMasterIdLst>
-    <p:notesMasterId r:id="rId20"/>
+    <p:notesMasterId r:id="rId29"/>
   </p:notesMasterIdLst>
   <p:sldIdLst>
     <p:sldId id="530" r:id="rId5"/>
@@ -18,11 +18,20 @@
     <p:sldId id="533" r:id="rId12"/>
     <p:sldId id="547" r:id="rId13"/>
     <p:sldId id="555" r:id="rId14"/>
-    <p:sldId id="552" r:id="rId15"/>
-    <p:sldId id="553" r:id="rId16"/>
-    <p:sldId id="554" r:id="rId17"/>
-    <p:sldId id="549" r:id="rId18"/>
-    <p:sldId id="544" r:id="rId19"/>
+    <p:sldId id="566" r:id="rId15"/>
+    <p:sldId id="564" r:id="rId16"/>
+    <p:sldId id="563" r:id="rId17"/>
+    <p:sldId id="562" r:id="rId18"/>
+    <p:sldId id="565" r:id="rId19"/>
+    <p:sldId id="559" r:id="rId20"/>
+    <p:sldId id="558" r:id="rId21"/>
+    <p:sldId id="560" r:id="rId22"/>
+    <p:sldId id="561" r:id="rId23"/>
+    <p:sldId id="552" r:id="rId24"/>
+    <p:sldId id="553" r:id="rId25"/>
+    <p:sldId id="554" r:id="rId26"/>
+    <p:sldId id="549" r:id="rId27"/>
+    <p:sldId id="544" r:id="rId28"/>
   </p:sldIdLst>
   <p:sldSz cx="12192000" cy="6858000"/>
   <p:notesSz cx="6858000" cy="9144000"/>
@@ -17503,6 +17512,25 @@
             </a:r>
           </a:p>
           <a:p>
+            <a:pPr algn="r"/>
+            <a:r>
+              <a:rPr lang="en-US" sz="2400" dirty="0">
+                <a:solidFill>
+                  <a:srgbClr val="CCCCCC"/>
+                </a:solidFill>
+                <a:latin typeface="Consolas" panose="020B0609020204030204" pitchFamily="49" charset="0"/>
+              </a:rPr>
+              <a:t>*Scrubbed Data</a:t>
+            </a:r>
+            <a:endParaRPr lang="en-US" sz="2400" b="0" dirty="0">
+              <a:solidFill>
+                <a:srgbClr val="CCCCCC"/>
+              </a:solidFill>
+              <a:effectLst/>
+              <a:latin typeface="Consolas" panose="020B0609020204030204" pitchFamily="49" charset="0"/>
+            </a:endParaRPr>
+          </a:p>
+          <a:p>
             <a:endParaRPr lang="en-US" dirty="0"/>
           </a:p>
         </p:txBody>
@@ -17555,8 +17583,8 @@
         </p:nvSpPr>
         <p:spPr>
           <a:xfrm>
-            <a:off x="1987455" y="72511"/>
-            <a:ext cx="8776797" cy="1069848"/>
+            <a:off x="441159" y="72511"/>
+            <a:ext cx="10844462" cy="1069848"/>
           </a:xfrm>
         </p:spPr>
         <p:txBody>
@@ -17565,127 +17593,62 @@
           <a:p>
             <a:r>
               <a:rPr lang="en-US" dirty="0"/>
-              <a:t>Findings and implications</a:t>
-            </a:r>
-          </a:p>
-        </p:txBody>
-      </p:sp>
-      <p:sp>
-        <p:nvSpPr>
-          <p:cNvPr id="3" name="Subtitle 2">
-            <a:extLst>
-              <a:ext uri="{FF2B5EF4-FFF2-40B4-BE49-F238E27FC236}">
-                <a16:creationId xmlns:a16="http://schemas.microsoft.com/office/drawing/2014/main" id="{5A82A8B0-333F-633E-3FA7-D38DBFB10971}"/>
-              </a:ext>
-            </a:extLst>
-          </p:cNvPr>
-          <p:cNvSpPr>
-            <a:spLocks noGrp="1"/>
-          </p:cNvSpPr>
-          <p:nvPr>
-            <p:ph type="subTitle" idx="1"/>
-          </p:nvPr>
-        </p:nvSpPr>
-        <p:spPr>
+              <a:t>All companies' Historical data</a:t>
+            </a:r>
+          </a:p>
+        </p:txBody>
+      </p:sp>
+      <p:pic>
+        <p:nvPicPr>
+          <p:cNvPr id="9218" name="Picture 2">
+            <a:extLst>
+              <a:ext uri="{FF2B5EF4-FFF2-40B4-BE49-F238E27FC236}">
+                <a16:creationId xmlns:a16="http://schemas.microsoft.com/office/drawing/2014/main" id="{9F87E822-9551-9F16-1AE6-4027C68733E4}"/>
+              </a:ext>
+            </a:extLst>
+          </p:cNvPr>
+          <p:cNvPicPr>
+            <a:picLocks noChangeAspect="1" noChangeArrowheads="1"/>
+          </p:cNvPicPr>
+          <p:nvPr/>
+        </p:nvPicPr>
+        <p:blipFill>
+          <a:blip r:embed="rId2">
+            <a:extLst>
+              <a:ext uri="{28A0092B-C50C-407E-A947-70E740481C1C}">
+                <a14:useLocalDpi xmlns:a14="http://schemas.microsoft.com/office/drawing/2010/main" val="0"/>
+              </a:ext>
+            </a:extLst>
+          </a:blip>
+          <a:srcRect/>
+          <a:stretch>
+            <a:fillRect/>
+          </a:stretch>
+        </p:blipFill>
+        <p:spPr bwMode="auto">
           <a:xfrm>
-            <a:off x="505325" y="1259305"/>
-            <a:ext cx="11269579" cy="5430253"/>
-          </a:xfrm>
-        </p:spPr>
-        <p:txBody>
-          <a:bodyPr/>
-          <a:lstStyle/>
-          <a:p>
-            <a:pPr marL="457200" indent="-457200" algn="l">
-              <a:buFont typeface="Arial" panose="020B0604020202020204" pitchFamily="34" charset="0"/>
-              <a:buChar char="•"/>
-            </a:pPr>
-            <a:r>
-              <a:rPr lang="en-US" sz="2800" b="0" dirty="0">
+            <a:off x="3015164" y="1976438"/>
+            <a:ext cx="5953125" cy="4429125"/>
+          </a:xfrm>
+          <a:prstGeom prst="rect">
+            <a:avLst/>
+          </a:prstGeom>
+          <a:noFill/>
+          <a:extLst>
+            <a:ext uri="{909E8E84-426E-40DD-AFC4-6F175D3DCCD1}">
+              <a14:hiddenFill xmlns:a14="http://schemas.microsoft.com/office/drawing/2010/main">
                 <a:solidFill>
-                  <a:srgbClr val="CCCCCC"/>
+                  <a:srgbClr val="FFFFFF"/>
                 </a:solidFill>
-                <a:effectLst/>
-                <a:latin typeface="Consolas" panose="020B0609020204030204" pitchFamily="49" charset="0"/>
-              </a:rPr>
-              <a:t>The findings indicate NVDA had the highest closing prices with the largest growth in closing dollar amount for 2025.</a:t>
-            </a:r>
-          </a:p>
-          <a:p>
-            <a:pPr marL="457200" indent="-457200" algn="l">
-              <a:buFont typeface="Arial" panose="020B0604020202020204" pitchFamily="34" charset="0"/>
-              <a:buChar char="•"/>
-            </a:pPr>
-            <a:r>
-              <a:rPr lang="en-US" sz="2800" b="0" dirty="0">
-                <a:solidFill>
-                  <a:srgbClr val="CCCCCC"/>
-                </a:solidFill>
-                <a:effectLst/>
-                <a:latin typeface="Consolas" panose="020B0609020204030204" pitchFamily="49" charset="0"/>
-              </a:rPr>
-              <a:t>The findings indicate GOOG had the lowest closing prices with the smallest growth in closing dollar amount for 2025.</a:t>
-            </a:r>
-          </a:p>
-          <a:p>
-            <a:pPr marL="457200" indent="-457200" algn="l">
-              <a:buFont typeface="Arial" panose="020B0604020202020204" pitchFamily="34" charset="0"/>
-              <a:buChar char="•"/>
-            </a:pPr>
-            <a:r>
-              <a:rPr lang="en-US" sz="2800" b="0" dirty="0">
-                <a:solidFill>
-                  <a:srgbClr val="CCCCCC"/>
-                </a:solidFill>
-                <a:effectLst/>
-                <a:latin typeface="Consolas" panose="020B0609020204030204" pitchFamily="49" charset="0"/>
-              </a:rPr>
-              <a:t>INTC did not contain enough data for a comparative analysis resulting in a small scrubbing or cleaning of data.</a:t>
-            </a:r>
-          </a:p>
-          <a:p>
-            <a:pPr marL="457200" indent="-457200" algn="l">
-              <a:buFont typeface="Arial" panose="020B0604020202020204" pitchFamily="34" charset="0"/>
-              <a:buChar char="•"/>
-            </a:pPr>
-            <a:r>
-              <a:rPr lang="en-US" sz="2800" b="0" dirty="0">
-                <a:solidFill>
-                  <a:srgbClr val="CCCCCC"/>
-                </a:solidFill>
-                <a:effectLst/>
-                <a:latin typeface="Consolas" panose="020B0609020204030204" pitchFamily="49" charset="0"/>
-              </a:rPr>
-              <a:t>All companies had an Artificial Intelligence focus while still maintaining pre-AI and pre-Covid business objectives.</a:t>
-            </a:r>
-          </a:p>
-          <a:p>
-            <a:br>
-              <a:rPr lang="en-US" sz="2800" b="0" dirty="0">
-                <a:solidFill>
-                  <a:srgbClr val="CCCCCC"/>
-                </a:solidFill>
-                <a:effectLst/>
-                <a:latin typeface="Consolas" panose="020B0609020204030204" pitchFamily="49" charset="0"/>
-              </a:rPr>
-            </a:br>
-            <a:endParaRPr lang="en-US" sz="2800" b="0" dirty="0">
-              <a:solidFill>
-                <a:srgbClr val="CCCCCC"/>
-              </a:solidFill>
-              <a:effectLst/>
-              <a:latin typeface="Consolas" panose="020B0609020204030204" pitchFamily="49" charset="0"/>
-            </a:endParaRPr>
-          </a:p>
-          <a:p>
-            <a:endParaRPr lang="en-US" dirty="0"/>
-          </a:p>
-        </p:txBody>
-      </p:sp>
+              </a14:hiddenFill>
+            </a:ext>
+          </a:extLst>
+        </p:spPr>
+      </p:pic>
     </p:spTree>
     <p:extLst>
       <p:ext uri="{BB962C8B-B14F-4D97-AF65-F5344CB8AC3E}">
-        <p14:creationId xmlns:p14="http://schemas.microsoft.com/office/powerpoint/2010/main" val="4174470146"/>
+        <p14:creationId xmlns:p14="http://schemas.microsoft.com/office/powerpoint/2010/main" val="4207463833"/>
       </p:ext>
     </p:extLst>
   </p:cSld>
@@ -17730,8 +17693,8 @@
         </p:nvSpPr>
         <p:spPr>
           <a:xfrm>
-            <a:off x="1987456" y="72511"/>
-            <a:ext cx="8937218" cy="1069848"/>
+            <a:off x="1155032" y="72511"/>
+            <a:ext cx="8568248" cy="1069848"/>
           </a:xfrm>
         </p:spPr>
         <p:txBody>
@@ -17739,94 +17702,67 @@
           <a:lstStyle/>
           <a:p>
             <a:r>
+              <a:rPr lang="en-US" dirty="0" err="1"/>
+              <a:t>Nvda</a:t>
+            </a:r>
+            <a:r>
               <a:rPr lang="en-US" dirty="0"/>
-              <a:t>Software version control</a:t>
-            </a:r>
-          </a:p>
-        </p:txBody>
-      </p:sp>
-      <p:sp>
-        <p:nvSpPr>
-          <p:cNvPr id="3" name="Subtitle 2">
-            <a:extLst>
-              <a:ext uri="{FF2B5EF4-FFF2-40B4-BE49-F238E27FC236}">
-                <a16:creationId xmlns:a16="http://schemas.microsoft.com/office/drawing/2014/main" id="{5A82A8B0-333F-633E-3FA7-D38DBFB10971}"/>
-              </a:ext>
-            </a:extLst>
-          </p:cNvPr>
-          <p:cNvSpPr>
-            <a:spLocks noGrp="1"/>
-          </p:cNvSpPr>
-          <p:nvPr>
-            <p:ph type="subTitle" idx="1"/>
-          </p:nvPr>
-        </p:nvSpPr>
-        <p:spPr>
+              <a:t> projection</a:t>
+            </a:r>
+          </a:p>
+        </p:txBody>
+      </p:sp>
+      <p:pic>
+        <p:nvPicPr>
+          <p:cNvPr id="7170" name="Picture 2">
+            <a:extLst>
+              <a:ext uri="{FF2B5EF4-FFF2-40B4-BE49-F238E27FC236}">
+                <a16:creationId xmlns:a16="http://schemas.microsoft.com/office/drawing/2014/main" id="{901A2640-DB7F-E446-A63E-55E02B5C266D}"/>
+              </a:ext>
+            </a:extLst>
+          </p:cNvPr>
+          <p:cNvPicPr>
+            <a:picLocks noChangeAspect="1" noChangeArrowheads="1"/>
+          </p:cNvPicPr>
+          <p:nvPr/>
+        </p:nvPicPr>
+        <p:blipFill>
+          <a:blip r:embed="rId2">
+            <a:extLst>
+              <a:ext uri="{28A0092B-C50C-407E-A947-70E740481C1C}">
+                <a14:useLocalDpi xmlns:a14="http://schemas.microsoft.com/office/drawing/2010/main" val="0"/>
+              </a:ext>
+            </a:extLst>
+          </a:blip>
+          <a:srcRect/>
+          <a:stretch>
+            <a:fillRect/>
+          </a:stretch>
+        </p:blipFill>
+        <p:spPr bwMode="auto">
           <a:xfrm>
-            <a:off x="505325" y="1259305"/>
-            <a:ext cx="11269579" cy="5430253"/>
-          </a:xfrm>
-        </p:spPr>
-        <p:txBody>
-          <a:bodyPr/>
-          <a:lstStyle/>
-          <a:p>
-            <a:pPr marL="457200" indent="-457200" algn="l">
-              <a:buFont typeface="Arial" panose="020B0604020202020204" pitchFamily="34" charset="0"/>
-              <a:buChar char="•"/>
-            </a:pPr>
-            <a:r>
-              <a:rPr lang="en-US" sz="2800" b="0" dirty="0">
+            <a:off x="1414462" y="1232414"/>
+            <a:ext cx="9363075" cy="5553075"/>
+          </a:xfrm>
+          <a:prstGeom prst="rect">
+            <a:avLst/>
+          </a:prstGeom>
+          <a:noFill/>
+          <a:extLst>
+            <a:ext uri="{909E8E84-426E-40DD-AFC4-6F175D3DCCD1}">
+              <a14:hiddenFill xmlns:a14="http://schemas.microsoft.com/office/drawing/2010/main">
                 <a:solidFill>
-                  <a:srgbClr val="CCCCCC"/>
+                  <a:srgbClr val="FFFFFF"/>
                 </a:solidFill>
-                <a:effectLst/>
-                <a:latin typeface="Consolas" panose="020B0609020204030204" pitchFamily="49" charset="0"/>
-              </a:rPr>
-              <a:t>A GitHub repository was created - all group members contributed to repository.</a:t>
-            </a:r>
-          </a:p>
-          <a:p>
-            <a:pPr marL="457200" indent="-457200" algn="l">
-              <a:buFont typeface="Arial" panose="020B0604020202020204" pitchFamily="34" charset="0"/>
-              <a:buChar char="•"/>
-            </a:pPr>
-            <a:r>
-              <a:rPr lang="en-US" sz="2800" b="0" dirty="0">
-                <a:solidFill>
-                  <a:srgbClr val="CCCCCC"/>
-                </a:solidFill>
-                <a:effectLst/>
-                <a:latin typeface="Consolas" panose="020B0609020204030204" pitchFamily="49" charset="0"/>
-              </a:rPr>
-              <a:t>Each GitHub commit was annotated to ensure proper communication between group members.</a:t>
-            </a:r>
-          </a:p>
-          <a:p>
-            <a:pPr marL="457200" indent="-457200" algn="l">
-              <a:buFont typeface="Arial" panose="020B0604020202020204" pitchFamily="34" charset="0"/>
-              <a:buChar char="•"/>
-            </a:pPr>
-            <a:r>
-              <a:rPr lang="en-US" sz="2800" b="0" dirty="0">
-                <a:solidFill>
-                  <a:srgbClr val="CCCCCC"/>
-                </a:solidFill>
-                <a:effectLst/>
-                <a:latin typeface="Consolas" panose="020B0609020204030204" pitchFamily="49" charset="0"/>
-              </a:rPr>
-              <a:t>Supporting files were also uploaded and evaluated by the group.</a:t>
-            </a:r>
-          </a:p>
-          <a:p>
-            <a:endParaRPr lang="en-US" dirty="0"/>
-          </a:p>
-        </p:txBody>
-      </p:sp>
+              </a14:hiddenFill>
+            </a:ext>
+          </a:extLst>
+        </p:spPr>
+      </p:pic>
     </p:spTree>
     <p:extLst>
       <p:ext uri="{BB962C8B-B14F-4D97-AF65-F5344CB8AC3E}">
-        <p14:creationId xmlns:p14="http://schemas.microsoft.com/office/powerpoint/2010/main" val="4153323784"/>
+        <p14:creationId xmlns:p14="http://schemas.microsoft.com/office/powerpoint/2010/main" val="1470261900"/>
       </p:ext>
     </p:extLst>
   </p:cSld>
@@ -17871,8 +17807,8 @@
         </p:nvSpPr>
         <p:spPr>
           <a:xfrm>
-            <a:off x="1987456" y="72511"/>
-            <a:ext cx="7735824" cy="1069848"/>
+            <a:off x="1155032" y="72511"/>
+            <a:ext cx="8568248" cy="1069848"/>
           </a:xfrm>
         </p:spPr>
         <p:txBody>
@@ -17880,94 +17816,67 @@
           <a:lstStyle/>
           <a:p>
             <a:r>
+              <a:rPr lang="en-US" dirty="0" err="1"/>
+              <a:t>Msft</a:t>
+            </a:r>
+            <a:r>
               <a:rPr lang="en-US" dirty="0"/>
-              <a:t>documentation</a:t>
-            </a:r>
-          </a:p>
-        </p:txBody>
-      </p:sp>
-      <p:sp>
-        <p:nvSpPr>
-          <p:cNvPr id="3" name="Subtitle 2">
-            <a:extLst>
-              <a:ext uri="{FF2B5EF4-FFF2-40B4-BE49-F238E27FC236}">
-                <a16:creationId xmlns:a16="http://schemas.microsoft.com/office/drawing/2014/main" id="{5A82A8B0-333F-633E-3FA7-D38DBFB10971}"/>
-              </a:ext>
-            </a:extLst>
-          </p:cNvPr>
-          <p:cNvSpPr>
-            <a:spLocks noGrp="1"/>
-          </p:cNvSpPr>
-          <p:nvPr>
-            <p:ph type="subTitle" idx="1"/>
-          </p:nvPr>
-        </p:nvSpPr>
-        <p:spPr>
+              <a:t> projection</a:t>
+            </a:r>
+          </a:p>
+        </p:txBody>
+      </p:sp>
+      <p:pic>
+        <p:nvPicPr>
+          <p:cNvPr id="6146" name="Picture 2">
+            <a:extLst>
+              <a:ext uri="{FF2B5EF4-FFF2-40B4-BE49-F238E27FC236}">
+                <a16:creationId xmlns:a16="http://schemas.microsoft.com/office/drawing/2014/main" id="{052CEBCB-3CB4-65C6-9971-1085B1D681F6}"/>
+              </a:ext>
+            </a:extLst>
+          </p:cNvPr>
+          <p:cNvPicPr>
+            <a:picLocks noChangeAspect="1" noChangeArrowheads="1"/>
+          </p:cNvPicPr>
+          <p:nvPr/>
+        </p:nvPicPr>
+        <p:blipFill>
+          <a:blip r:embed="rId2">
+            <a:extLst>
+              <a:ext uri="{28A0092B-C50C-407E-A947-70E740481C1C}">
+                <a14:useLocalDpi xmlns:a14="http://schemas.microsoft.com/office/drawing/2010/main" val="0"/>
+              </a:ext>
+            </a:extLst>
+          </a:blip>
+          <a:srcRect/>
+          <a:stretch>
+            <a:fillRect/>
+          </a:stretch>
+        </p:blipFill>
+        <p:spPr bwMode="auto">
           <a:xfrm>
-            <a:off x="505325" y="1259305"/>
-            <a:ext cx="11269579" cy="5430253"/>
-          </a:xfrm>
-        </p:spPr>
-        <p:txBody>
-          <a:bodyPr/>
-          <a:lstStyle/>
-          <a:p>
-            <a:pPr marL="457200" indent="-457200" algn="l">
-              <a:buFont typeface="Arial" panose="020B0604020202020204" pitchFamily="34" charset="0"/>
-              <a:buChar char="•"/>
-            </a:pPr>
-            <a:r>
-              <a:rPr lang="en-US" sz="2800" b="0" dirty="0">
+            <a:off x="1630773" y="1232414"/>
+            <a:ext cx="9363075" cy="5553075"/>
+          </a:xfrm>
+          <a:prstGeom prst="rect">
+            <a:avLst/>
+          </a:prstGeom>
+          <a:noFill/>
+          <a:extLst>
+            <a:ext uri="{909E8E84-426E-40DD-AFC4-6F175D3DCCD1}">
+              <a14:hiddenFill xmlns:a14="http://schemas.microsoft.com/office/drawing/2010/main">
                 <a:solidFill>
-                  <a:srgbClr val="CCCCCC"/>
+                  <a:srgbClr val="FFFFFF"/>
                 </a:solidFill>
-                <a:effectLst/>
-                <a:latin typeface="Consolas" panose="020B0609020204030204" pitchFamily="49" charset="0"/>
-              </a:rPr>
-              <a:t>Relevant notes have been included with all code as well as the Readme.md.</a:t>
-            </a:r>
-          </a:p>
-          <a:p>
-            <a:pPr marL="457200" indent="-457200" algn="l">
-              <a:buFont typeface="Arial" panose="020B0604020202020204" pitchFamily="34" charset="0"/>
-              <a:buChar char="•"/>
-            </a:pPr>
-            <a:r>
-              <a:rPr lang="en-US" sz="2800" b="0" dirty="0">
-                <a:solidFill>
-                  <a:srgbClr val="CCCCCC"/>
-                </a:solidFill>
-                <a:effectLst/>
-                <a:latin typeface="Consolas" panose="020B0609020204030204" pitchFamily="49" charset="0"/>
-              </a:rPr>
-              <a:t>There are no installation requirements.</a:t>
-            </a:r>
-          </a:p>
-          <a:p>
-            <a:pPr marL="457200" indent="-457200" algn="l">
-              <a:buFont typeface="Arial" panose="020B0604020202020204" pitchFamily="34" charset="0"/>
-              <a:buChar char="•"/>
-            </a:pPr>
-            <a:r>
-              <a:rPr lang="en-US" sz="2800" b="0" dirty="0">
-                <a:solidFill>
-                  <a:srgbClr val="CCCCCC"/>
-                </a:solidFill>
-                <a:effectLst/>
-                <a:latin typeface="Consolas" panose="020B0609020204030204" pitchFamily="49" charset="0"/>
-              </a:rPr>
-              <a:t>The Readme.md file contains graphical representation of the research findings.</a:t>
-            </a:r>
-          </a:p>
-          <a:p>
-            <a:endParaRPr lang="en-US" dirty="0"/>
-          </a:p>
-        </p:txBody>
-      </p:sp>
+              </a14:hiddenFill>
+            </a:ext>
+          </a:extLst>
+        </p:spPr>
+      </p:pic>
     </p:spTree>
     <p:extLst>
       <p:ext uri="{BB962C8B-B14F-4D97-AF65-F5344CB8AC3E}">
-        <p14:creationId xmlns:p14="http://schemas.microsoft.com/office/powerpoint/2010/main" val="398114617"/>
+        <p14:creationId xmlns:p14="http://schemas.microsoft.com/office/powerpoint/2010/main" val="3664699840"/>
       </p:ext>
     </p:extLst>
   </p:cSld>
@@ -18012,8 +17921,8 @@
         </p:nvSpPr>
         <p:spPr>
           <a:xfrm>
-            <a:off x="1987456" y="72511"/>
-            <a:ext cx="7735824" cy="1069848"/>
+            <a:off x="1155032" y="72511"/>
+            <a:ext cx="8568248" cy="1069848"/>
           </a:xfrm>
         </p:spPr>
         <p:txBody>
@@ -18022,93 +17931,62 @@
           <a:p>
             <a:r>
               <a:rPr lang="en-US" dirty="0"/>
-              <a:t>Future development</a:t>
-            </a:r>
-          </a:p>
-        </p:txBody>
-      </p:sp>
-      <p:sp>
-        <p:nvSpPr>
-          <p:cNvPr id="3" name="Subtitle 2">
-            <a:extLst>
-              <a:ext uri="{FF2B5EF4-FFF2-40B4-BE49-F238E27FC236}">
-                <a16:creationId xmlns:a16="http://schemas.microsoft.com/office/drawing/2014/main" id="{5A82A8B0-333F-633E-3FA7-D38DBFB10971}"/>
-              </a:ext>
-            </a:extLst>
-          </p:cNvPr>
-          <p:cNvSpPr>
-            <a:spLocks noGrp="1"/>
-          </p:cNvSpPr>
-          <p:nvPr>
-            <p:ph type="subTitle" idx="1"/>
-          </p:nvPr>
-        </p:nvSpPr>
-        <p:spPr>
+              <a:t>Meta projection</a:t>
+            </a:r>
+          </a:p>
+        </p:txBody>
+      </p:sp>
+      <p:pic>
+        <p:nvPicPr>
+          <p:cNvPr id="5122" name="Picture 2">
+            <a:extLst>
+              <a:ext uri="{FF2B5EF4-FFF2-40B4-BE49-F238E27FC236}">
+                <a16:creationId xmlns:a16="http://schemas.microsoft.com/office/drawing/2014/main" id="{281F87F7-A6A7-27CE-47A8-6ABD70B8E936}"/>
+              </a:ext>
+            </a:extLst>
+          </p:cNvPr>
+          <p:cNvPicPr>
+            <a:picLocks noChangeAspect="1" noChangeArrowheads="1"/>
+          </p:cNvPicPr>
+          <p:nvPr/>
+        </p:nvPicPr>
+        <p:blipFill>
+          <a:blip r:embed="rId2">
+            <a:extLst>
+              <a:ext uri="{28A0092B-C50C-407E-A947-70E740481C1C}">
+                <a14:useLocalDpi xmlns:a14="http://schemas.microsoft.com/office/drawing/2010/main" val="0"/>
+              </a:ext>
+            </a:extLst>
+          </a:blip>
+          <a:srcRect/>
+          <a:stretch>
+            <a:fillRect/>
+          </a:stretch>
+        </p:blipFill>
+        <p:spPr bwMode="auto">
           <a:xfrm>
-            <a:off x="505325" y="1259305"/>
-            <a:ext cx="11269579" cy="5430253"/>
-          </a:xfrm>
-        </p:spPr>
-        <p:txBody>
-          <a:bodyPr/>
-          <a:lstStyle/>
-          <a:p>
-            <a:pPr marL="457200" indent="-457200" algn="l">
-              <a:buFont typeface="Arial" panose="020B0604020202020204" pitchFamily="34" charset="0"/>
-              <a:buChar char="•"/>
-            </a:pPr>
-            <a:r>
-              <a:rPr lang="en-US" sz="2800" b="0" dirty="0">
+            <a:off x="1551807" y="1232414"/>
+            <a:ext cx="9344025" cy="5553075"/>
+          </a:xfrm>
+          <a:prstGeom prst="rect">
+            <a:avLst/>
+          </a:prstGeom>
+          <a:noFill/>
+          <a:extLst>
+            <a:ext uri="{909E8E84-426E-40DD-AFC4-6F175D3DCCD1}">
+              <a14:hiddenFill xmlns:a14="http://schemas.microsoft.com/office/drawing/2010/main">
                 <a:solidFill>
-                  <a:srgbClr val="CCCCCC"/>
+                  <a:srgbClr val="FFFFFF"/>
                 </a:solidFill>
-                <a:effectLst/>
-                <a:latin typeface="Consolas" panose="020B0609020204030204" pitchFamily="49" charset="0"/>
-              </a:rPr>
-              <a:t>Future development includes the identification of price range during the 2020 - 2024 timeframe and the average fluctuation of stock prices.  </a:t>
-            </a:r>
-          </a:p>
-          <a:p>
-            <a:pPr marL="457200" indent="-457200" algn="l">
-              <a:buFont typeface="Arial" panose="020B0604020202020204" pitchFamily="34" charset="0"/>
-              <a:buChar char="•"/>
-            </a:pPr>
-            <a:r>
-              <a:rPr lang="en-US" sz="2800" b="0" dirty="0">
-                <a:solidFill>
-                  <a:srgbClr val="CCCCCC"/>
-                </a:solidFill>
-                <a:effectLst/>
-                <a:latin typeface="Consolas" panose="020B0609020204030204" pitchFamily="49" charset="0"/>
-              </a:rPr>
-              <a:t>Highest percentage gains should be determined from initial 2020 price to closing of 2025.  </a:t>
-            </a:r>
-          </a:p>
-          <a:p>
-            <a:pPr marL="457200" indent="-457200" algn="l">
-              <a:buFont typeface="Arial" panose="020B0604020202020204" pitchFamily="34" charset="0"/>
-              <a:buChar char="•"/>
-            </a:pPr>
-            <a:r>
-              <a:rPr lang="en-US" sz="2800" b="0" dirty="0">
-                <a:solidFill>
-                  <a:srgbClr val="CCCCCC"/>
-                </a:solidFill>
-                <a:effectLst/>
-                <a:latin typeface="Consolas" panose="020B0609020204030204" pitchFamily="49" charset="0"/>
-              </a:rPr>
-              <a:t>Recommendations should be made to determine which stock to purchase for maximum profit in 2025.</a:t>
-            </a:r>
-          </a:p>
-          <a:p>
-            <a:endParaRPr lang="en-US" dirty="0"/>
-          </a:p>
-        </p:txBody>
-      </p:sp>
+              </a14:hiddenFill>
+            </a:ext>
+          </a:extLst>
+        </p:spPr>
+      </p:pic>
     </p:spTree>
     <p:extLst>
       <p:ext uri="{BB962C8B-B14F-4D97-AF65-F5344CB8AC3E}">
-        <p14:creationId xmlns:p14="http://schemas.microsoft.com/office/powerpoint/2010/main" val="87203755"/>
+        <p14:creationId xmlns:p14="http://schemas.microsoft.com/office/powerpoint/2010/main" val="1553301760"/>
       </p:ext>
     </p:extLst>
   </p:cSld>
@@ -18140,7 +18018,7 @@
           <p:cNvPr id="2" name="Title 1">
             <a:extLst>
               <a:ext uri="{FF2B5EF4-FFF2-40B4-BE49-F238E27FC236}">
-                <a16:creationId xmlns:a16="http://schemas.microsoft.com/office/drawing/2014/main" id="{2C9E1892-81E6-551C-7B5A-DEA68224520B}"/>
+                <a16:creationId xmlns:a16="http://schemas.microsoft.com/office/drawing/2014/main" id="{F41F0E99-07CC-9576-AFD7-C52151AD0EA3}"/>
               </a:ext>
             </a:extLst>
           </p:cNvPr>
@@ -18148,35 +18026,529 @@
             <a:spLocks noGrp="1"/>
           </p:cNvSpPr>
           <p:nvPr>
-            <p:ph type="title"/>
+            <p:ph type="ctrTitle"/>
           </p:nvPr>
         </p:nvSpPr>
-        <p:spPr/>
+        <p:spPr>
+          <a:xfrm>
+            <a:off x="1155032" y="72511"/>
+            <a:ext cx="8568248" cy="1069848"/>
+          </a:xfrm>
+        </p:spPr>
         <p:txBody>
           <a:bodyPr/>
           <a:lstStyle/>
           <a:p>
             <a:r>
-              <a:rPr lang="en-US" sz="4800" b="1" spc="600" dirty="0">
-                <a:ln w="28575">
-                  <a:noFill/>
-                  <a:prstDash val="solid"/>
-                </a:ln>
+              <a:rPr lang="en-US" dirty="0" err="1"/>
+              <a:t>Tsla</a:t>
+            </a:r>
+            <a:r>
+              <a:rPr lang="en-US" dirty="0"/>
+              <a:t> projection</a:t>
+            </a:r>
+          </a:p>
+        </p:txBody>
+      </p:sp>
+      <p:pic>
+        <p:nvPicPr>
+          <p:cNvPr id="8194" name="Picture 2">
+            <a:extLst>
+              <a:ext uri="{FF2B5EF4-FFF2-40B4-BE49-F238E27FC236}">
+                <a16:creationId xmlns:a16="http://schemas.microsoft.com/office/drawing/2014/main" id="{A5328B3C-3C5B-9465-2886-75F444AF2D20}"/>
+              </a:ext>
+            </a:extLst>
+          </p:cNvPr>
+          <p:cNvPicPr>
+            <a:picLocks noChangeAspect="1" noChangeArrowheads="1"/>
+          </p:cNvPicPr>
+          <p:nvPr/>
+        </p:nvPicPr>
+        <p:blipFill>
+          <a:blip r:embed="rId2">
+            <a:extLst>
+              <a:ext uri="{28A0092B-C50C-407E-A947-70E740481C1C}">
+                <a14:useLocalDpi xmlns:a14="http://schemas.microsoft.com/office/drawing/2010/main" val="0"/>
+              </a:ext>
+            </a:extLst>
+          </a:blip>
+          <a:srcRect/>
+          <a:stretch>
+            <a:fillRect/>
+          </a:stretch>
+        </p:blipFill>
+        <p:spPr bwMode="auto">
+          <a:xfrm>
+            <a:off x="1542282" y="1251464"/>
+            <a:ext cx="9363075" cy="5534025"/>
+          </a:xfrm>
+          <a:prstGeom prst="rect">
+            <a:avLst/>
+          </a:prstGeom>
+          <a:noFill/>
+          <a:extLst>
+            <a:ext uri="{909E8E84-426E-40DD-AFC4-6F175D3DCCD1}">
+              <a14:hiddenFill xmlns:a14="http://schemas.microsoft.com/office/drawing/2010/main">
                 <a:solidFill>
-                  <a:schemeClr val="bg1"/>
+                  <a:srgbClr val="FFFFFF"/>
                 </a:solidFill>
-                <a:latin typeface="Tw Cen MT" panose="020B0602020104020603" pitchFamily="34" charset="77"/>
-              </a:rPr>
-              <a:t>THANK YOU</a:t>
-            </a:r>
-            <a:endParaRPr lang="en-US" dirty="0"/>
-          </a:p>
-        </p:txBody>
-      </p:sp>
+              </a14:hiddenFill>
+            </a:ext>
+          </a:extLst>
+        </p:spPr>
+      </p:pic>
     </p:spTree>
     <p:extLst>
       <p:ext uri="{BB962C8B-B14F-4D97-AF65-F5344CB8AC3E}">
-        <p14:creationId xmlns:p14="http://schemas.microsoft.com/office/powerpoint/2010/main" val="1877701230"/>
+        <p14:creationId xmlns:p14="http://schemas.microsoft.com/office/powerpoint/2010/main" val="3923924306"/>
+      </p:ext>
+    </p:extLst>
+  </p:cSld>
+  <p:clrMapOvr>
+    <a:masterClrMapping/>
+  </p:clrMapOvr>
+</p:sld>
+</file>
+
+<file path=ppt/slides/slide16.xml><?xml version="1.0" encoding="utf-8"?>
+<p:sld xmlns:a="http://schemas.openxmlformats.org/drawingml/2006/main" xmlns:r="http://schemas.openxmlformats.org/officeDocument/2006/relationships" xmlns:p="http://schemas.openxmlformats.org/presentationml/2006/main">
+  <p:cSld>
+    <p:spTree>
+      <p:nvGrpSpPr>
+        <p:cNvPr id="1" name=""/>
+        <p:cNvGrpSpPr/>
+        <p:nvPr/>
+      </p:nvGrpSpPr>
+      <p:grpSpPr>
+        <a:xfrm>
+          <a:off x="0" y="0"/>
+          <a:ext cx="0" cy="0"/>
+          <a:chOff x="0" y="0"/>
+          <a:chExt cx="0" cy="0"/>
+        </a:xfrm>
+      </p:grpSpPr>
+      <p:sp>
+        <p:nvSpPr>
+          <p:cNvPr id="2" name="Title 1">
+            <a:extLst>
+              <a:ext uri="{FF2B5EF4-FFF2-40B4-BE49-F238E27FC236}">
+                <a16:creationId xmlns:a16="http://schemas.microsoft.com/office/drawing/2014/main" id="{F41F0E99-07CC-9576-AFD7-C52151AD0EA3}"/>
+              </a:ext>
+            </a:extLst>
+          </p:cNvPr>
+          <p:cNvSpPr>
+            <a:spLocks noGrp="1"/>
+          </p:cNvSpPr>
+          <p:nvPr>
+            <p:ph type="ctrTitle"/>
+          </p:nvPr>
+        </p:nvSpPr>
+        <p:spPr>
+          <a:xfrm>
+            <a:off x="1155032" y="72511"/>
+            <a:ext cx="8568248" cy="1069848"/>
+          </a:xfrm>
+        </p:spPr>
+        <p:txBody>
+          <a:bodyPr/>
+          <a:lstStyle/>
+          <a:p>
+            <a:r>
+              <a:rPr lang="en-US" dirty="0"/>
+              <a:t>ANET PROJECTION</a:t>
+            </a:r>
+          </a:p>
+        </p:txBody>
+      </p:sp>
+      <p:pic>
+        <p:nvPicPr>
+          <p:cNvPr id="2050" name="Picture 2">
+            <a:extLst>
+              <a:ext uri="{FF2B5EF4-FFF2-40B4-BE49-F238E27FC236}">
+                <a16:creationId xmlns:a16="http://schemas.microsoft.com/office/drawing/2014/main" id="{A0CF28FB-F424-B893-7729-D5AA488B8CE0}"/>
+              </a:ext>
+            </a:extLst>
+          </p:cNvPr>
+          <p:cNvPicPr>
+            <a:picLocks noChangeAspect="1" noChangeArrowheads="1"/>
+          </p:cNvPicPr>
+          <p:nvPr/>
+        </p:nvPicPr>
+        <p:blipFill>
+          <a:blip r:embed="rId2">
+            <a:extLst>
+              <a:ext uri="{28A0092B-C50C-407E-A947-70E740481C1C}">
+                <a14:useLocalDpi xmlns:a14="http://schemas.microsoft.com/office/drawing/2010/main" val="0"/>
+              </a:ext>
+            </a:extLst>
+          </a:blip>
+          <a:srcRect/>
+          <a:stretch>
+            <a:fillRect/>
+          </a:stretch>
+        </p:blipFill>
+        <p:spPr bwMode="auto">
+          <a:xfrm>
+            <a:off x="1409700" y="1270514"/>
+            <a:ext cx="9372600" cy="5514975"/>
+          </a:xfrm>
+          <a:prstGeom prst="rect">
+            <a:avLst/>
+          </a:prstGeom>
+          <a:noFill/>
+          <a:extLst>
+            <a:ext uri="{909E8E84-426E-40DD-AFC4-6F175D3DCCD1}">
+              <a14:hiddenFill xmlns:a14="http://schemas.microsoft.com/office/drawing/2010/main">
+                <a:solidFill>
+                  <a:srgbClr val="FFFFFF"/>
+                </a:solidFill>
+              </a14:hiddenFill>
+            </a:ext>
+          </a:extLst>
+        </p:spPr>
+      </p:pic>
+    </p:spTree>
+    <p:extLst>
+      <p:ext uri="{BB962C8B-B14F-4D97-AF65-F5344CB8AC3E}">
+        <p14:creationId xmlns:p14="http://schemas.microsoft.com/office/powerpoint/2010/main" val="3163997360"/>
+      </p:ext>
+    </p:extLst>
+  </p:cSld>
+  <p:clrMapOvr>
+    <a:masterClrMapping/>
+  </p:clrMapOvr>
+</p:sld>
+</file>
+
+<file path=ppt/slides/slide17.xml><?xml version="1.0" encoding="utf-8"?>
+<p:sld xmlns:a="http://schemas.openxmlformats.org/drawingml/2006/main" xmlns:r="http://schemas.openxmlformats.org/officeDocument/2006/relationships" xmlns:p="http://schemas.openxmlformats.org/presentationml/2006/main">
+  <p:cSld>
+    <p:spTree>
+      <p:nvGrpSpPr>
+        <p:cNvPr id="1" name=""/>
+        <p:cNvGrpSpPr/>
+        <p:nvPr/>
+      </p:nvGrpSpPr>
+      <p:grpSpPr>
+        <a:xfrm>
+          <a:off x="0" y="0"/>
+          <a:ext cx="0" cy="0"/>
+          <a:chOff x="0" y="0"/>
+          <a:chExt cx="0" cy="0"/>
+        </a:xfrm>
+      </p:grpSpPr>
+      <p:sp>
+        <p:nvSpPr>
+          <p:cNvPr id="2" name="Title 1">
+            <a:extLst>
+              <a:ext uri="{FF2B5EF4-FFF2-40B4-BE49-F238E27FC236}">
+                <a16:creationId xmlns:a16="http://schemas.microsoft.com/office/drawing/2014/main" id="{F41F0E99-07CC-9576-AFD7-C52151AD0EA3}"/>
+              </a:ext>
+            </a:extLst>
+          </p:cNvPr>
+          <p:cNvSpPr>
+            <a:spLocks noGrp="1"/>
+          </p:cNvSpPr>
+          <p:nvPr>
+            <p:ph type="ctrTitle"/>
+          </p:nvPr>
+        </p:nvSpPr>
+        <p:spPr>
+          <a:xfrm>
+            <a:off x="1155032" y="72511"/>
+            <a:ext cx="8568248" cy="1069848"/>
+          </a:xfrm>
+        </p:spPr>
+        <p:txBody>
+          <a:bodyPr/>
+          <a:lstStyle/>
+          <a:p>
+            <a:r>
+              <a:rPr lang="en-US" dirty="0"/>
+              <a:t>AMZN PROJECTION</a:t>
+            </a:r>
+          </a:p>
+        </p:txBody>
+      </p:sp>
+      <p:pic>
+        <p:nvPicPr>
+          <p:cNvPr id="1028" name="Picture 4">
+            <a:extLst>
+              <a:ext uri="{FF2B5EF4-FFF2-40B4-BE49-F238E27FC236}">
+                <a16:creationId xmlns:a16="http://schemas.microsoft.com/office/drawing/2014/main" id="{0A16C832-728B-16C5-FC33-9BF24BC0CE51}"/>
+              </a:ext>
+            </a:extLst>
+          </p:cNvPr>
+          <p:cNvPicPr>
+            <a:picLocks noChangeAspect="1" noChangeArrowheads="1"/>
+          </p:cNvPicPr>
+          <p:nvPr/>
+        </p:nvPicPr>
+        <p:blipFill>
+          <a:blip r:embed="rId2">
+            <a:extLst>
+              <a:ext uri="{28A0092B-C50C-407E-A947-70E740481C1C}">
+                <a14:useLocalDpi xmlns:a14="http://schemas.microsoft.com/office/drawing/2010/main" val="0"/>
+              </a:ext>
+            </a:extLst>
+          </a:blip>
+          <a:srcRect/>
+          <a:stretch>
+            <a:fillRect/>
+          </a:stretch>
+        </p:blipFill>
+        <p:spPr bwMode="auto">
+          <a:xfrm>
+            <a:off x="1340567" y="1489589"/>
+            <a:ext cx="9353550" cy="5295900"/>
+          </a:xfrm>
+          <a:prstGeom prst="rect">
+            <a:avLst/>
+          </a:prstGeom>
+          <a:noFill/>
+          <a:extLst>
+            <a:ext uri="{909E8E84-426E-40DD-AFC4-6F175D3DCCD1}">
+              <a14:hiddenFill xmlns:a14="http://schemas.microsoft.com/office/drawing/2010/main">
+                <a:solidFill>
+                  <a:srgbClr val="FFFFFF"/>
+                </a:solidFill>
+              </a14:hiddenFill>
+            </a:ext>
+          </a:extLst>
+        </p:spPr>
+      </p:pic>
+    </p:spTree>
+    <p:extLst>
+      <p:ext uri="{BB962C8B-B14F-4D97-AF65-F5344CB8AC3E}">
+        <p14:creationId xmlns:p14="http://schemas.microsoft.com/office/powerpoint/2010/main" val="1919301366"/>
+      </p:ext>
+    </p:extLst>
+  </p:cSld>
+  <p:clrMapOvr>
+    <a:masterClrMapping/>
+  </p:clrMapOvr>
+</p:sld>
+</file>
+
+<file path=ppt/slides/slide18.xml><?xml version="1.0" encoding="utf-8"?>
+<p:sld xmlns:a="http://schemas.openxmlformats.org/drawingml/2006/main" xmlns:r="http://schemas.openxmlformats.org/officeDocument/2006/relationships" xmlns:p="http://schemas.openxmlformats.org/presentationml/2006/main">
+  <p:cSld>
+    <p:spTree>
+      <p:nvGrpSpPr>
+        <p:cNvPr id="1" name=""/>
+        <p:cNvGrpSpPr/>
+        <p:nvPr/>
+      </p:nvGrpSpPr>
+      <p:grpSpPr>
+        <a:xfrm>
+          <a:off x="0" y="0"/>
+          <a:ext cx="0" cy="0"/>
+          <a:chOff x="0" y="0"/>
+          <a:chExt cx="0" cy="0"/>
+        </a:xfrm>
+      </p:grpSpPr>
+      <p:sp>
+        <p:nvSpPr>
+          <p:cNvPr id="2" name="Title 1">
+            <a:extLst>
+              <a:ext uri="{FF2B5EF4-FFF2-40B4-BE49-F238E27FC236}">
+                <a16:creationId xmlns:a16="http://schemas.microsoft.com/office/drawing/2014/main" id="{F41F0E99-07CC-9576-AFD7-C52151AD0EA3}"/>
+              </a:ext>
+            </a:extLst>
+          </p:cNvPr>
+          <p:cNvSpPr>
+            <a:spLocks noGrp="1"/>
+          </p:cNvSpPr>
+          <p:nvPr>
+            <p:ph type="ctrTitle"/>
+          </p:nvPr>
+        </p:nvSpPr>
+        <p:spPr>
+          <a:xfrm>
+            <a:off x="1155032" y="72511"/>
+            <a:ext cx="8568248" cy="1069848"/>
+          </a:xfrm>
+        </p:spPr>
+        <p:txBody>
+          <a:bodyPr/>
+          <a:lstStyle/>
+          <a:p>
+            <a:r>
+              <a:rPr lang="en-US" dirty="0" err="1"/>
+              <a:t>Goog</a:t>
+            </a:r>
+            <a:r>
+              <a:rPr lang="en-US" dirty="0"/>
+              <a:t> projection</a:t>
+            </a:r>
+          </a:p>
+        </p:txBody>
+      </p:sp>
+      <p:pic>
+        <p:nvPicPr>
+          <p:cNvPr id="3076" name="Picture 4">
+            <a:extLst>
+              <a:ext uri="{FF2B5EF4-FFF2-40B4-BE49-F238E27FC236}">
+                <a16:creationId xmlns:a16="http://schemas.microsoft.com/office/drawing/2014/main" id="{FEEB7750-0125-EFC8-8B10-9F070DBE9A79}"/>
+              </a:ext>
+            </a:extLst>
+          </p:cNvPr>
+          <p:cNvPicPr>
+            <a:picLocks noChangeAspect="1" noChangeArrowheads="1"/>
+          </p:cNvPicPr>
+          <p:nvPr/>
+        </p:nvPicPr>
+        <p:blipFill>
+          <a:blip r:embed="rId2">
+            <a:extLst>
+              <a:ext uri="{28A0092B-C50C-407E-A947-70E740481C1C}">
+                <a14:useLocalDpi xmlns:a14="http://schemas.microsoft.com/office/drawing/2010/main" val="0"/>
+              </a:ext>
+            </a:extLst>
+          </a:blip>
+          <a:srcRect/>
+          <a:stretch>
+            <a:fillRect/>
+          </a:stretch>
+        </p:blipFill>
+        <p:spPr bwMode="auto">
+          <a:xfrm>
+            <a:off x="1542282" y="1352550"/>
+            <a:ext cx="9363075" cy="5505450"/>
+          </a:xfrm>
+          <a:prstGeom prst="rect">
+            <a:avLst/>
+          </a:prstGeom>
+          <a:noFill/>
+          <a:extLst>
+            <a:ext uri="{909E8E84-426E-40DD-AFC4-6F175D3DCCD1}">
+              <a14:hiddenFill xmlns:a14="http://schemas.microsoft.com/office/drawing/2010/main">
+                <a:solidFill>
+                  <a:srgbClr val="FFFFFF"/>
+                </a:solidFill>
+              </a14:hiddenFill>
+            </a:ext>
+          </a:extLst>
+        </p:spPr>
+      </p:pic>
+    </p:spTree>
+    <p:extLst>
+      <p:ext uri="{BB962C8B-B14F-4D97-AF65-F5344CB8AC3E}">
+        <p14:creationId xmlns:p14="http://schemas.microsoft.com/office/powerpoint/2010/main" val="2607039714"/>
+      </p:ext>
+    </p:extLst>
+  </p:cSld>
+  <p:clrMapOvr>
+    <a:masterClrMapping/>
+  </p:clrMapOvr>
+</p:sld>
+</file>
+
+<file path=ppt/slides/slide19.xml><?xml version="1.0" encoding="utf-8"?>
+<p:sld xmlns:a="http://schemas.openxmlformats.org/drawingml/2006/main" xmlns:r="http://schemas.openxmlformats.org/officeDocument/2006/relationships" xmlns:p="http://schemas.openxmlformats.org/presentationml/2006/main">
+  <p:cSld>
+    <p:spTree>
+      <p:nvGrpSpPr>
+        <p:cNvPr id="1" name=""/>
+        <p:cNvGrpSpPr/>
+        <p:nvPr/>
+      </p:nvGrpSpPr>
+      <p:grpSpPr>
+        <a:xfrm>
+          <a:off x="0" y="0"/>
+          <a:ext cx="0" cy="0"/>
+          <a:chOff x="0" y="0"/>
+          <a:chExt cx="0" cy="0"/>
+        </a:xfrm>
+      </p:grpSpPr>
+      <p:sp>
+        <p:nvSpPr>
+          <p:cNvPr id="2" name="Title 1">
+            <a:extLst>
+              <a:ext uri="{FF2B5EF4-FFF2-40B4-BE49-F238E27FC236}">
+                <a16:creationId xmlns:a16="http://schemas.microsoft.com/office/drawing/2014/main" id="{F41F0E99-07CC-9576-AFD7-C52151AD0EA3}"/>
+              </a:ext>
+            </a:extLst>
+          </p:cNvPr>
+          <p:cNvSpPr>
+            <a:spLocks noGrp="1"/>
+          </p:cNvSpPr>
+          <p:nvPr>
+            <p:ph type="ctrTitle"/>
+          </p:nvPr>
+        </p:nvSpPr>
+        <p:spPr>
+          <a:xfrm>
+            <a:off x="1155032" y="72511"/>
+            <a:ext cx="8568248" cy="1069848"/>
+          </a:xfrm>
+        </p:spPr>
+        <p:txBody>
+          <a:bodyPr/>
+          <a:lstStyle/>
+          <a:p>
+            <a:r>
+              <a:rPr lang="en-US" dirty="0" err="1"/>
+              <a:t>Intc</a:t>
+            </a:r>
+            <a:r>
+              <a:rPr lang="en-US" dirty="0"/>
+              <a:t> projection</a:t>
+            </a:r>
+          </a:p>
+        </p:txBody>
+      </p:sp>
+      <p:pic>
+        <p:nvPicPr>
+          <p:cNvPr id="4098" name="Picture 2">
+            <a:extLst>
+              <a:ext uri="{FF2B5EF4-FFF2-40B4-BE49-F238E27FC236}">
+                <a16:creationId xmlns:a16="http://schemas.microsoft.com/office/drawing/2014/main" id="{FB3982B1-6295-AA71-8C8E-264378323EAC}"/>
+              </a:ext>
+            </a:extLst>
+          </p:cNvPr>
+          <p:cNvPicPr>
+            <a:picLocks noChangeAspect="1" noChangeArrowheads="1"/>
+          </p:cNvPicPr>
+          <p:nvPr/>
+        </p:nvPicPr>
+        <p:blipFill>
+          <a:blip r:embed="rId2">
+            <a:extLst>
+              <a:ext uri="{28A0092B-C50C-407E-A947-70E740481C1C}">
+                <a14:useLocalDpi xmlns:a14="http://schemas.microsoft.com/office/drawing/2010/main" val="0"/>
+              </a:ext>
+            </a:extLst>
+          </a:blip>
+          <a:srcRect/>
+          <a:stretch>
+            <a:fillRect/>
+          </a:stretch>
+        </p:blipFill>
+        <p:spPr bwMode="auto">
+          <a:xfrm>
+            <a:off x="1576848" y="1241939"/>
+            <a:ext cx="9372600" cy="5543550"/>
+          </a:xfrm>
+          <a:prstGeom prst="rect">
+            <a:avLst/>
+          </a:prstGeom>
+          <a:noFill/>
+          <a:extLst>
+            <a:ext uri="{909E8E84-426E-40DD-AFC4-6F175D3DCCD1}">
+              <a14:hiddenFill xmlns:a14="http://schemas.microsoft.com/office/drawing/2010/main">
+                <a:solidFill>
+                  <a:srgbClr val="FFFFFF"/>
+                </a:solidFill>
+              </a14:hiddenFill>
+            </a:ext>
+          </a:extLst>
+        </p:spPr>
+      </p:pic>
+    </p:spTree>
+    <p:extLst>
+      <p:ext uri="{BB962C8B-B14F-4D97-AF65-F5344CB8AC3E}">
+        <p14:creationId xmlns:p14="http://schemas.microsoft.com/office/powerpoint/2010/main" val="3162950599"/>
       </p:ext>
     </p:extLst>
   </p:cSld>
@@ -18354,6 +18726,684 @@
 </p:sld>
 </file>
 
+<file path=ppt/slides/slide20.xml><?xml version="1.0" encoding="utf-8"?>
+<p:sld xmlns:a="http://schemas.openxmlformats.org/drawingml/2006/main" xmlns:r="http://schemas.openxmlformats.org/officeDocument/2006/relationships" xmlns:p="http://schemas.openxmlformats.org/presentationml/2006/main">
+  <p:cSld>
+    <p:spTree>
+      <p:nvGrpSpPr>
+        <p:cNvPr id="1" name=""/>
+        <p:cNvGrpSpPr/>
+        <p:nvPr/>
+      </p:nvGrpSpPr>
+      <p:grpSpPr>
+        <a:xfrm>
+          <a:off x="0" y="0"/>
+          <a:ext cx="0" cy="0"/>
+          <a:chOff x="0" y="0"/>
+          <a:chExt cx="0" cy="0"/>
+        </a:xfrm>
+      </p:grpSpPr>
+      <p:sp>
+        <p:nvSpPr>
+          <p:cNvPr id="2" name="Title 1">
+            <a:extLst>
+              <a:ext uri="{FF2B5EF4-FFF2-40B4-BE49-F238E27FC236}">
+                <a16:creationId xmlns:a16="http://schemas.microsoft.com/office/drawing/2014/main" id="{F41F0E99-07CC-9576-AFD7-C52151AD0EA3}"/>
+              </a:ext>
+            </a:extLst>
+          </p:cNvPr>
+          <p:cNvSpPr>
+            <a:spLocks noGrp="1"/>
+          </p:cNvSpPr>
+          <p:nvPr>
+            <p:ph type="ctrTitle"/>
+          </p:nvPr>
+        </p:nvSpPr>
+        <p:spPr>
+          <a:xfrm>
+            <a:off x="1987455" y="72511"/>
+            <a:ext cx="8776797" cy="1069848"/>
+          </a:xfrm>
+        </p:spPr>
+        <p:txBody>
+          <a:bodyPr/>
+          <a:lstStyle/>
+          <a:p>
+            <a:r>
+              <a:rPr lang="en-US" dirty="0"/>
+              <a:t>Findings and implications</a:t>
+            </a:r>
+          </a:p>
+        </p:txBody>
+      </p:sp>
+      <p:sp>
+        <p:nvSpPr>
+          <p:cNvPr id="3" name="Subtitle 2">
+            <a:extLst>
+              <a:ext uri="{FF2B5EF4-FFF2-40B4-BE49-F238E27FC236}">
+                <a16:creationId xmlns:a16="http://schemas.microsoft.com/office/drawing/2014/main" id="{5A82A8B0-333F-633E-3FA7-D38DBFB10971}"/>
+              </a:ext>
+            </a:extLst>
+          </p:cNvPr>
+          <p:cNvSpPr>
+            <a:spLocks noGrp="1"/>
+          </p:cNvSpPr>
+          <p:nvPr>
+            <p:ph type="subTitle" idx="1"/>
+          </p:nvPr>
+        </p:nvSpPr>
+        <p:spPr>
+          <a:xfrm>
+            <a:off x="505325" y="1259305"/>
+            <a:ext cx="11269579" cy="5430253"/>
+          </a:xfrm>
+        </p:spPr>
+        <p:txBody>
+          <a:bodyPr/>
+          <a:lstStyle/>
+          <a:p>
+            <a:pPr marL="457200" indent="-457200" algn="l">
+              <a:buFont typeface="Arial" panose="020B0604020202020204" pitchFamily="34" charset="0"/>
+              <a:buChar char="•"/>
+            </a:pPr>
+            <a:r>
+              <a:rPr lang="en-US" sz="2800" b="0" dirty="0">
+                <a:solidFill>
+                  <a:srgbClr val="CCCCCC"/>
+                </a:solidFill>
+                <a:effectLst/>
+                <a:latin typeface="Consolas" panose="020B0609020204030204" pitchFamily="49" charset="0"/>
+              </a:rPr>
+              <a:t>The findings indicate NVDA had the highest closing prices with the largest growth in closing dollar amount for 2025.</a:t>
+            </a:r>
+          </a:p>
+          <a:p>
+            <a:pPr marL="457200" indent="-457200" algn="l">
+              <a:buFont typeface="Arial" panose="020B0604020202020204" pitchFamily="34" charset="0"/>
+              <a:buChar char="•"/>
+            </a:pPr>
+            <a:r>
+              <a:rPr lang="en-US" sz="2800" b="0" dirty="0">
+                <a:solidFill>
+                  <a:srgbClr val="CCCCCC"/>
+                </a:solidFill>
+                <a:effectLst/>
+                <a:latin typeface="Consolas" panose="020B0609020204030204" pitchFamily="49" charset="0"/>
+              </a:rPr>
+              <a:t>The findings indicate INTC had the lowest closing prices with the smallest growth in closing dollar amount for 2025.</a:t>
+            </a:r>
+          </a:p>
+          <a:p>
+            <a:pPr marL="457200" indent="-457200" algn="l">
+              <a:buFont typeface="Arial" panose="020B0604020202020204" pitchFamily="34" charset="0"/>
+              <a:buChar char="•"/>
+            </a:pPr>
+            <a:r>
+              <a:rPr lang="en-US" sz="2800" b="0" dirty="0">
+                <a:solidFill>
+                  <a:srgbClr val="CCCCCC"/>
+                </a:solidFill>
+                <a:effectLst/>
+                <a:latin typeface="Consolas" panose="020B0609020204030204" pitchFamily="49" charset="0"/>
+              </a:rPr>
+              <a:t>All companies had an Artificial Intelligence focus while still maintaining pre-AI and pre-Covid business objectives.</a:t>
+            </a:r>
+          </a:p>
+          <a:p>
+            <a:br>
+              <a:rPr lang="en-US" sz="2800" b="0" dirty="0">
+                <a:solidFill>
+                  <a:srgbClr val="CCCCCC"/>
+                </a:solidFill>
+                <a:effectLst/>
+                <a:latin typeface="Consolas" panose="020B0609020204030204" pitchFamily="49" charset="0"/>
+              </a:rPr>
+            </a:br>
+            <a:endParaRPr lang="en-US" sz="2800" b="0" dirty="0">
+              <a:solidFill>
+                <a:srgbClr val="CCCCCC"/>
+              </a:solidFill>
+              <a:effectLst/>
+              <a:latin typeface="Consolas" panose="020B0609020204030204" pitchFamily="49" charset="0"/>
+            </a:endParaRPr>
+          </a:p>
+          <a:p>
+            <a:endParaRPr lang="en-US" dirty="0"/>
+          </a:p>
+        </p:txBody>
+      </p:sp>
+    </p:spTree>
+    <p:extLst>
+      <p:ext uri="{BB962C8B-B14F-4D97-AF65-F5344CB8AC3E}">
+        <p14:creationId xmlns:p14="http://schemas.microsoft.com/office/powerpoint/2010/main" val="4174470146"/>
+      </p:ext>
+    </p:extLst>
+  </p:cSld>
+  <p:clrMapOvr>
+    <a:masterClrMapping/>
+  </p:clrMapOvr>
+</p:sld>
+</file>
+
+<file path=ppt/slides/slide21.xml><?xml version="1.0" encoding="utf-8"?>
+<p:sld xmlns:a="http://schemas.openxmlformats.org/drawingml/2006/main" xmlns:r="http://schemas.openxmlformats.org/officeDocument/2006/relationships" xmlns:p="http://schemas.openxmlformats.org/presentationml/2006/main">
+  <p:cSld>
+    <p:spTree>
+      <p:nvGrpSpPr>
+        <p:cNvPr id="1" name=""/>
+        <p:cNvGrpSpPr/>
+        <p:nvPr/>
+      </p:nvGrpSpPr>
+      <p:grpSpPr>
+        <a:xfrm>
+          <a:off x="0" y="0"/>
+          <a:ext cx="0" cy="0"/>
+          <a:chOff x="0" y="0"/>
+          <a:chExt cx="0" cy="0"/>
+        </a:xfrm>
+      </p:grpSpPr>
+      <p:sp>
+        <p:nvSpPr>
+          <p:cNvPr id="2" name="Title 1">
+            <a:extLst>
+              <a:ext uri="{FF2B5EF4-FFF2-40B4-BE49-F238E27FC236}">
+                <a16:creationId xmlns:a16="http://schemas.microsoft.com/office/drawing/2014/main" id="{F41F0E99-07CC-9576-AFD7-C52151AD0EA3}"/>
+              </a:ext>
+            </a:extLst>
+          </p:cNvPr>
+          <p:cNvSpPr>
+            <a:spLocks noGrp="1"/>
+          </p:cNvSpPr>
+          <p:nvPr>
+            <p:ph type="ctrTitle"/>
+          </p:nvPr>
+        </p:nvSpPr>
+        <p:spPr>
+          <a:xfrm>
+            <a:off x="1987456" y="72511"/>
+            <a:ext cx="8937218" cy="1069848"/>
+          </a:xfrm>
+        </p:spPr>
+        <p:txBody>
+          <a:bodyPr/>
+          <a:lstStyle/>
+          <a:p>
+            <a:r>
+              <a:rPr lang="en-US" dirty="0"/>
+              <a:t>Software version control</a:t>
+            </a:r>
+          </a:p>
+        </p:txBody>
+      </p:sp>
+      <p:sp>
+        <p:nvSpPr>
+          <p:cNvPr id="3" name="Subtitle 2">
+            <a:extLst>
+              <a:ext uri="{FF2B5EF4-FFF2-40B4-BE49-F238E27FC236}">
+                <a16:creationId xmlns:a16="http://schemas.microsoft.com/office/drawing/2014/main" id="{5A82A8B0-333F-633E-3FA7-D38DBFB10971}"/>
+              </a:ext>
+            </a:extLst>
+          </p:cNvPr>
+          <p:cNvSpPr>
+            <a:spLocks noGrp="1"/>
+          </p:cNvSpPr>
+          <p:nvPr>
+            <p:ph type="subTitle" idx="1"/>
+          </p:nvPr>
+        </p:nvSpPr>
+        <p:spPr>
+          <a:xfrm>
+            <a:off x="505325" y="1259305"/>
+            <a:ext cx="11269579" cy="5430253"/>
+          </a:xfrm>
+        </p:spPr>
+        <p:txBody>
+          <a:bodyPr/>
+          <a:lstStyle/>
+          <a:p>
+            <a:pPr marL="457200" indent="-457200" algn="l">
+              <a:buFont typeface="Arial" panose="020B0604020202020204" pitchFamily="34" charset="0"/>
+              <a:buChar char="•"/>
+            </a:pPr>
+            <a:r>
+              <a:rPr lang="en-US" sz="2800" b="0" dirty="0">
+                <a:solidFill>
+                  <a:srgbClr val="CCCCCC"/>
+                </a:solidFill>
+                <a:effectLst/>
+                <a:latin typeface="Consolas" panose="020B0609020204030204" pitchFamily="49" charset="0"/>
+              </a:rPr>
+              <a:t>A GitHub repository was created - all group members contributed to repository.</a:t>
+            </a:r>
+          </a:p>
+          <a:p>
+            <a:pPr marL="457200" indent="-457200" algn="l">
+              <a:buFont typeface="Arial" panose="020B0604020202020204" pitchFamily="34" charset="0"/>
+              <a:buChar char="•"/>
+            </a:pPr>
+            <a:r>
+              <a:rPr lang="en-US" sz="2800" b="0" dirty="0">
+                <a:solidFill>
+                  <a:srgbClr val="CCCCCC"/>
+                </a:solidFill>
+                <a:effectLst/>
+                <a:latin typeface="Consolas" panose="020B0609020204030204" pitchFamily="49" charset="0"/>
+              </a:rPr>
+              <a:t>Each GitHub commit was annotated to ensure proper communication between group members.</a:t>
+            </a:r>
+          </a:p>
+          <a:p>
+            <a:pPr marL="457200" indent="-457200" algn="l">
+              <a:buFont typeface="Arial" panose="020B0604020202020204" pitchFamily="34" charset="0"/>
+              <a:buChar char="•"/>
+            </a:pPr>
+            <a:r>
+              <a:rPr lang="en-US" sz="2800" b="0" dirty="0">
+                <a:solidFill>
+                  <a:srgbClr val="CCCCCC"/>
+                </a:solidFill>
+                <a:effectLst/>
+                <a:latin typeface="Consolas" panose="020B0609020204030204" pitchFamily="49" charset="0"/>
+              </a:rPr>
+              <a:t>Supporting files were also uploaded and evaluated by the group.</a:t>
+            </a:r>
+          </a:p>
+          <a:p>
+            <a:endParaRPr lang="en-US" dirty="0"/>
+          </a:p>
+        </p:txBody>
+      </p:sp>
+    </p:spTree>
+    <p:extLst>
+      <p:ext uri="{BB962C8B-B14F-4D97-AF65-F5344CB8AC3E}">
+        <p14:creationId xmlns:p14="http://schemas.microsoft.com/office/powerpoint/2010/main" val="4153323784"/>
+      </p:ext>
+    </p:extLst>
+  </p:cSld>
+  <p:clrMapOvr>
+    <a:masterClrMapping/>
+  </p:clrMapOvr>
+</p:sld>
+</file>
+
+<file path=ppt/slides/slide22.xml><?xml version="1.0" encoding="utf-8"?>
+<p:sld xmlns:a="http://schemas.openxmlformats.org/drawingml/2006/main" xmlns:r="http://schemas.openxmlformats.org/officeDocument/2006/relationships" xmlns:p="http://schemas.openxmlformats.org/presentationml/2006/main">
+  <p:cSld>
+    <p:spTree>
+      <p:nvGrpSpPr>
+        <p:cNvPr id="1" name=""/>
+        <p:cNvGrpSpPr/>
+        <p:nvPr/>
+      </p:nvGrpSpPr>
+      <p:grpSpPr>
+        <a:xfrm>
+          <a:off x="0" y="0"/>
+          <a:ext cx="0" cy="0"/>
+          <a:chOff x="0" y="0"/>
+          <a:chExt cx="0" cy="0"/>
+        </a:xfrm>
+      </p:grpSpPr>
+      <p:sp>
+        <p:nvSpPr>
+          <p:cNvPr id="2" name="Title 1">
+            <a:extLst>
+              <a:ext uri="{FF2B5EF4-FFF2-40B4-BE49-F238E27FC236}">
+                <a16:creationId xmlns:a16="http://schemas.microsoft.com/office/drawing/2014/main" id="{F41F0E99-07CC-9576-AFD7-C52151AD0EA3}"/>
+              </a:ext>
+            </a:extLst>
+          </p:cNvPr>
+          <p:cNvSpPr>
+            <a:spLocks noGrp="1"/>
+          </p:cNvSpPr>
+          <p:nvPr>
+            <p:ph type="ctrTitle"/>
+          </p:nvPr>
+        </p:nvSpPr>
+        <p:spPr>
+          <a:xfrm>
+            <a:off x="1987456" y="72511"/>
+            <a:ext cx="7735824" cy="1069848"/>
+          </a:xfrm>
+        </p:spPr>
+        <p:txBody>
+          <a:bodyPr/>
+          <a:lstStyle/>
+          <a:p>
+            <a:r>
+              <a:rPr lang="en-US" dirty="0"/>
+              <a:t>documentation</a:t>
+            </a:r>
+          </a:p>
+        </p:txBody>
+      </p:sp>
+      <p:sp>
+        <p:nvSpPr>
+          <p:cNvPr id="3" name="Subtitle 2">
+            <a:extLst>
+              <a:ext uri="{FF2B5EF4-FFF2-40B4-BE49-F238E27FC236}">
+                <a16:creationId xmlns:a16="http://schemas.microsoft.com/office/drawing/2014/main" id="{5A82A8B0-333F-633E-3FA7-D38DBFB10971}"/>
+              </a:ext>
+            </a:extLst>
+          </p:cNvPr>
+          <p:cNvSpPr>
+            <a:spLocks noGrp="1"/>
+          </p:cNvSpPr>
+          <p:nvPr>
+            <p:ph type="subTitle" idx="1"/>
+          </p:nvPr>
+        </p:nvSpPr>
+        <p:spPr>
+          <a:xfrm>
+            <a:off x="505325" y="1259305"/>
+            <a:ext cx="11269579" cy="5430253"/>
+          </a:xfrm>
+        </p:spPr>
+        <p:txBody>
+          <a:bodyPr/>
+          <a:lstStyle/>
+          <a:p>
+            <a:pPr marL="457200" indent="-457200" algn="l">
+              <a:buFont typeface="Arial" panose="020B0604020202020204" pitchFamily="34" charset="0"/>
+              <a:buChar char="•"/>
+            </a:pPr>
+            <a:r>
+              <a:rPr lang="en-US" sz="2800" b="0" dirty="0">
+                <a:solidFill>
+                  <a:srgbClr val="CCCCCC"/>
+                </a:solidFill>
+                <a:effectLst/>
+                <a:latin typeface="Consolas" panose="020B0609020204030204" pitchFamily="49" charset="0"/>
+              </a:rPr>
+              <a:t>Relevant notes have been included with all code as well as the Readme.md.</a:t>
+            </a:r>
+          </a:p>
+          <a:p>
+            <a:pPr marL="457200" indent="-457200" algn="l">
+              <a:buFont typeface="Arial" panose="020B0604020202020204" pitchFamily="34" charset="0"/>
+              <a:buChar char="•"/>
+            </a:pPr>
+            <a:r>
+              <a:rPr lang="en-US" sz="2800" b="0" dirty="0">
+                <a:solidFill>
+                  <a:srgbClr val="CCCCCC"/>
+                </a:solidFill>
+                <a:effectLst/>
+                <a:latin typeface="Consolas" panose="020B0609020204030204" pitchFamily="49" charset="0"/>
+              </a:rPr>
+              <a:t>There are no installation requirements.</a:t>
+            </a:r>
+          </a:p>
+          <a:p>
+            <a:pPr marL="457200" indent="-457200" algn="l">
+              <a:buFont typeface="Arial" panose="020B0604020202020204" pitchFamily="34" charset="0"/>
+              <a:buChar char="•"/>
+            </a:pPr>
+            <a:r>
+              <a:rPr lang="en-US" sz="2800" b="0" dirty="0">
+                <a:solidFill>
+                  <a:srgbClr val="CCCCCC"/>
+                </a:solidFill>
+                <a:effectLst/>
+                <a:latin typeface="Consolas" panose="020B0609020204030204" pitchFamily="49" charset="0"/>
+              </a:rPr>
+              <a:t>The Readme.md file contains graphical representation of the research findings.</a:t>
+            </a:r>
+          </a:p>
+          <a:p>
+            <a:endParaRPr lang="en-US" dirty="0"/>
+          </a:p>
+        </p:txBody>
+      </p:sp>
+    </p:spTree>
+    <p:extLst>
+      <p:ext uri="{BB962C8B-B14F-4D97-AF65-F5344CB8AC3E}">
+        <p14:creationId xmlns:p14="http://schemas.microsoft.com/office/powerpoint/2010/main" val="398114617"/>
+      </p:ext>
+    </p:extLst>
+  </p:cSld>
+  <p:clrMapOvr>
+    <a:masterClrMapping/>
+  </p:clrMapOvr>
+</p:sld>
+</file>
+
+<file path=ppt/slides/slide23.xml><?xml version="1.0" encoding="utf-8"?>
+<p:sld xmlns:a="http://schemas.openxmlformats.org/drawingml/2006/main" xmlns:r="http://schemas.openxmlformats.org/officeDocument/2006/relationships" xmlns:p="http://schemas.openxmlformats.org/presentationml/2006/main">
+  <p:cSld>
+    <p:spTree>
+      <p:nvGrpSpPr>
+        <p:cNvPr id="1" name=""/>
+        <p:cNvGrpSpPr/>
+        <p:nvPr/>
+      </p:nvGrpSpPr>
+      <p:grpSpPr>
+        <a:xfrm>
+          <a:off x="0" y="0"/>
+          <a:ext cx="0" cy="0"/>
+          <a:chOff x="0" y="0"/>
+          <a:chExt cx="0" cy="0"/>
+        </a:xfrm>
+      </p:grpSpPr>
+      <p:sp>
+        <p:nvSpPr>
+          <p:cNvPr id="2" name="Title 1">
+            <a:extLst>
+              <a:ext uri="{FF2B5EF4-FFF2-40B4-BE49-F238E27FC236}">
+                <a16:creationId xmlns:a16="http://schemas.microsoft.com/office/drawing/2014/main" id="{F41F0E99-07CC-9576-AFD7-C52151AD0EA3}"/>
+              </a:ext>
+            </a:extLst>
+          </p:cNvPr>
+          <p:cNvSpPr>
+            <a:spLocks noGrp="1"/>
+          </p:cNvSpPr>
+          <p:nvPr>
+            <p:ph type="ctrTitle"/>
+          </p:nvPr>
+        </p:nvSpPr>
+        <p:spPr>
+          <a:xfrm>
+            <a:off x="1987456" y="72511"/>
+            <a:ext cx="7735824" cy="1069848"/>
+          </a:xfrm>
+        </p:spPr>
+        <p:txBody>
+          <a:bodyPr/>
+          <a:lstStyle/>
+          <a:p>
+            <a:r>
+              <a:rPr lang="en-US" dirty="0"/>
+              <a:t>Future development</a:t>
+            </a:r>
+          </a:p>
+        </p:txBody>
+      </p:sp>
+      <p:sp>
+        <p:nvSpPr>
+          <p:cNvPr id="3" name="Subtitle 2">
+            <a:extLst>
+              <a:ext uri="{FF2B5EF4-FFF2-40B4-BE49-F238E27FC236}">
+                <a16:creationId xmlns:a16="http://schemas.microsoft.com/office/drawing/2014/main" id="{5A82A8B0-333F-633E-3FA7-D38DBFB10971}"/>
+              </a:ext>
+            </a:extLst>
+          </p:cNvPr>
+          <p:cNvSpPr>
+            <a:spLocks noGrp="1"/>
+          </p:cNvSpPr>
+          <p:nvPr>
+            <p:ph type="subTitle" idx="1"/>
+          </p:nvPr>
+        </p:nvSpPr>
+        <p:spPr>
+          <a:xfrm>
+            <a:off x="505325" y="1259305"/>
+            <a:ext cx="11269579" cy="5430253"/>
+          </a:xfrm>
+        </p:spPr>
+        <p:txBody>
+          <a:bodyPr/>
+          <a:lstStyle/>
+          <a:p>
+            <a:pPr marL="457200" indent="-457200" algn="l">
+              <a:buFont typeface="Arial" panose="020B0604020202020204" pitchFamily="34" charset="0"/>
+              <a:buChar char="•"/>
+            </a:pPr>
+            <a:r>
+              <a:rPr lang="en-US" sz="2800" b="0" dirty="0">
+                <a:solidFill>
+                  <a:srgbClr val="CCCCCC"/>
+                </a:solidFill>
+                <a:effectLst/>
+                <a:latin typeface="Consolas" panose="020B0609020204030204" pitchFamily="49" charset="0"/>
+              </a:rPr>
+              <a:t>Future development includes the identification of price range during the 2020 - 2024 timeframe and the average fluctuation of stock prices.  </a:t>
+            </a:r>
+          </a:p>
+          <a:p>
+            <a:pPr marL="457200" indent="-457200" algn="l">
+              <a:buFont typeface="Arial" panose="020B0604020202020204" pitchFamily="34" charset="0"/>
+              <a:buChar char="•"/>
+            </a:pPr>
+            <a:r>
+              <a:rPr lang="en-US" sz="2800" b="0" dirty="0">
+                <a:solidFill>
+                  <a:srgbClr val="CCCCCC"/>
+                </a:solidFill>
+                <a:effectLst/>
+                <a:latin typeface="Consolas" panose="020B0609020204030204" pitchFamily="49" charset="0"/>
+              </a:rPr>
+              <a:t>Highest percentage gains should be determined from initial 2020 price to closing of 2025.  </a:t>
+            </a:r>
+          </a:p>
+          <a:p>
+            <a:pPr marL="457200" indent="-457200" algn="l">
+              <a:buFont typeface="Arial" panose="020B0604020202020204" pitchFamily="34" charset="0"/>
+              <a:buChar char="•"/>
+            </a:pPr>
+            <a:r>
+              <a:rPr lang="en-US" sz="2800" b="0" dirty="0">
+                <a:solidFill>
+                  <a:srgbClr val="CCCCCC"/>
+                </a:solidFill>
+                <a:effectLst/>
+                <a:latin typeface="Consolas" panose="020B0609020204030204" pitchFamily="49" charset="0"/>
+              </a:rPr>
+              <a:t>Recommendations should be made to determine which stock to purchase for maximum profit in 2025.</a:t>
+            </a:r>
+          </a:p>
+          <a:p>
+            <a:pPr marL="457200" indent="-457200" algn="l">
+              <a:buFont typeface="Arial" panose="020B0604020202020204" pitchFamily="34" charset="0"/>
+              <a:buChar char="•"/>
+            </a:pPr>
+            <a:r>
+              <a:rPr lang="en-US" sz="2800" dirty="0">
+                <a:solidFill>
+                  <a:srgbClr val="CCCCCC"/>
+                </a:solidFill>
+                <a:latin typeface="Consolas" panose="020B0609020204030204" pitchFamily="49" charset="0"/>
+              </a:rPr>
+              <a:t>For Future Analysis it should be noted NVDA does not contain the equivalent historical data as the other companies and could skew the statistical findings.</a:t>
+            </a:r>
+          </a:p>
+          <a:p>
+            <a:pPr marL="457200" indent="-457200" algn="l">
+              <a:buFont typeface="Arial" panose="020B0604020202020204" pitchFamily="34" charset="0"/>
+              <a:buChar char="•"/>
+            </a:pPr>
+            <a:endParaRPr lang="en-US" sz="2800" b="0" dirty="0">
+              <a:solidFill>
+                <a:srgbClr val="CCCCCC"/>
+              </a:solidFill>
+              <a:effectLst/>
+              <a:latin typeface="Consolas" panose="020B0609020204030204" pitchFamily="49" charset="0"/>
+            </a:endParaRPr>
+          </a:p>
+          <a:p>
+            <a:endParaRPr lang="en-US" dirty="0"/>
+          </a:p>
+        </p:txBody>
+      </p:sp>
+    </p:spTree>
+    <p:extLst>
+      <p:ext uri="{BB962C8B-B14F-4D97-AF65-F5344CB8AC3E}">
+        <p14:creationId xmlns:p14="http://schemas.microsoft.com/office/powerpoint/2010/main" val="87203755"/>
+      </p:ext>
+    </p:extLst>
+  </p:cSld>
+  <p:clrMapOvr>
+    <a:masterClrMapping/>
+  </p:clrMapOvr>
+</p:sld>
+</file>
+
+<file path=ppt/slides/slide24.xml><?xml version="1.0" encoding="utf-8"?>
+<p:sld xmlns:a="http://schemas.openxmlformats.org/drawingml/2006/main" xmlns:r="http://schemas.openxmlformats.org/officeDocument/2006/relationships" xmlns:p="http://schemas.openxmlformats.org/presentationml/2006/main">
+  <p:cSld>
+    <p:spTree>
+      <p:nvGrpSpPr>
+        <p:cNvPr id="1" name=""/>
+        <p:cNvGrpSpPr/>
+        <p:nvPr/>
+      </p:nvGrpSpPr>
+      <p:grpSpPr>
+        <a:xfrm>
+          <a:off x="0" y="0"/>
+          <a:ext cx="0" cy="0"/>
+          <a:chOff x="0" y="0"/>
+          <a:chExt cx="0" cy="0"/>
+        </a:xfrm>
+      </p:grpSpPr>
+      <p:sp>
+        <p:nvSpPr>
+          <p:cNvPr id="2" name="Title 1">
+            <a:extLst>
+              <a:ext uri="{FF2B5EF4-FFF2-40B4-BE49-F238E27FC236}">
+                <a16:creationId xmlns:a16="http://schemas.microsoft.com/office/drawing/2014/main" id="{2C9E1892-81E6-551C-7B5A-DEA68224520B}"/>
+              </a:ext>
+            </a:extLst>
+          </p:cNvPr>
+          <p:cNvSpPr>
+            <a:spLocks noGrp="1"/>
+          </p:cNvSpPr>
+          <p:nvPr>
+            <p:ph type="title"/>
+          </p:nvPr>
+        </p:nvSpPr>
+        <p:spPr/>
+        <p:txBody>
+          <a:bodyPr/>
+          <a:lstStyle/>
+          <a:p>
+            <a:r>
+              <a:rPr lang="en-US" sz="4800" b="1" spc="600" dirty="0">
+                <a:ln w="28575">
+                  <a:noFill/>
+                  <a:prstDash val="solid"/>
+                </a:ln>
+                <a:solidFill>
+                  <a:schemeClr val="bg1"/>
+                </a:solidFill>
+                <a:latin typeface="Tw Cen MT" panose="020B0602020104020603" pitchFamily="34" charset="77"/>
+              </a:rPr>
+              <a:t>THANK YOU</a:t>
+            </a:r>
+            <a:endParaRPr lang="en-US" dirty="0"/>
+          </a:p>
+        </p:txBody>
+      </p:sp>
+    </p:spTree>
+    <p:extLst>
+      <p:ext uri="{BB962C8B-B14F-4D97-AF65-F5344CB8AC3E}">
+        <p14:creationId xmlns:p14="http://schemas.microsoft.com/office/powerpoint/2010/main" val="1877701230"/>
+      </p:ext>
+    </p:extLst>
+  </p:cSld>
+  <p:clrMapOvr>
+    <a:masterClrMapping/>
+  </p:clrMapOvr>
+</p:sld>
+</file>
+
 <file path=ppt/slides/slide3.xml><?xml version="1.0" encoding="utf-8"?>
 <p:sld xmlns:a="http://schemas.openxmlformats.org/drawingml/2006/main" xmlns:r="http://schemas.openxmlformats.org/officeDocument/2006/relationships" xmlns:p="http://schemas.openxmlformats.org/presentationml/2006/main">
   <p:cSld>
@@ -18547,7 +19597,7 @@
                 <a:effectLst/>
                 <a:latin typeface="Consolas" panose="020B0609020204030204" pitchFamily="49" charset="0"/>
               </a:rPr>
-              <a:t>concluded NVDA not only had the highest closing stock price but the highest future closing price for 2025 while GOOG had the lowest closing stock price and lowest future price for 2025.</a:t>
+              <a:t>concluded NVDA not only had the highest closing stock price but the highest future closing price for 2025 while INTC had the lowest closing stock price and lowest future price for 2025.</a:t>
             </a:r>
           </a:p>
         </p:txBody>
@@ -19397,11 +20447,117 @@
                 <a:effectLst/>
                 <a:latin typeface="Consolas" panose="020B0609020204030204" pitchFamily="49" charset="0"/>
               </a:rPr>
-              <a:t>Cleanup was achieved by originally plotting all companies together and then plotting individually to determine if each company contained sufficient data to include in the analysis.</a:t>
-            </a:r>
-          </a:p>
-          <a:p>
-            <a:endParaRPr lang="en-US" dirty="0"/>
+              <a:t>Cleanup was achieved by originally plotting all companies together and then plotting individually to determine if each company contained sufficient data to include in the analysis</a:t>
+            </a:r>
+            <a:r>
+              <a:rPr lang="en-US" sz="2800" dirty="0">
+                <a:solidFill>
+                  <a:srgbClr val="CCCCCC"/>
+                </a:solidFill>
+                <a:latin typeface="Consolas" panose="020B0609020204030204" pitchFamily="49" charset="0"/>
+              </a:rPr>
+              <a:t>.</a:t>
+            </a:r>
+          </a:p>
+          <a:p>
+            <a:pPr marL="457200" indent="-457200" algn="l">
+              <a:buFont typeface="Arial" panose="020B0604020202020204" pitchFamily="34" charset="0"/>
+              <a:buChar char="•"/>
+            </a:pPr>
+            <a:r>
+              <a:rPr lang="en-US" sz="2800" dirty="0">
+                <a:solidFill>
+                  <a:srgbClr val="CCCCCC"/>
+                </a:solidFill>
+                <a:latin typeface="Consolas" panose="020B0609020204030204" pitchFamily="49" charset="0"/>
+              </a:rPr>
+              <a:t>For Future Analysis it should be noted NVDA does not contain the equivalent historical data as the other companies and could skew the statistical findings.</a:t>
+            </a:r>
+          </a:p>
+          <a:p>
+            <a:pPr marL="457200" indent="-457200" algn="l">
+              <a:buFont typeface="Arial" panose="020B0604020202020204" pitchFamily="34" charset="0"/>
+              <a:buChar char="•"/>
+            </a:pPr>
+            <a:endParaRPr lang="en-US" sz="2800" b="0" dirty="0">
+              <a:solidFill>
+                <a:srgbClr val="CCCCCC"/>
+              </a:solidFill>
+              <a:effectLst/>
+              <a:latin typeface="Consolas" panose="020B0609020204030204" pitchFamily="49" charset="0"/>
+            </a:endParaRPr>
+          </a:p>
+          <a:p>
+            <a:pPr marL="457200" indent="-457200" algn="l">
+              <a:buFont typeface="Arial" panose="020B0604020202020204" pitchFamily="34" charset="0"/>
+              <a:buChar char="•"/>
+            </a:pPr>
+            <a:endParaRPr lang="en-US" sz="2800" dirty="0">
+              <a:solidFill>
+                <a:srgbClr val="CCCCCC"/>
+              </a:solidFill>
+              <a:latin typeface="Consolas" panose="020B0609020204030204" pitchFamily="49" charset="0"/>
+            </a:endParaRPr>
+          </a:p>
+          <a:p>
+            <a:pPr marL="457200" indent="-457200" algn="l">
+              <a:buFont typeface="Arial" panose="020B0604020202020204" pitchFamily="34" charset="0"/>
+              <a:buChar char="•"/>
+            </a:pPr>
+            <a:endParaRPr lang="en-US" sz="2800" b="0" dirty="0">
+              <a:solidFill>
+                <a:srgbClr val="CCCCCC"/>
+              </a:solidFill>
+              <a:effectLst/>
+              <a:latin typeface="Consolas" panose="020B0609020204030204" pitchFamily="49" charset="0"/>
+            </a:endParaRPr>
+          </a:p>
+          <a:p>
+            <a:pPr marL="457200" indent="-457200" algn="l">
+              <a:buFont typeface="Arial" panose="020B0604020202020204" pitchFamily="34" charset="0"/>
+              <a:buChar char="•"/>
+            </a:pPr>
+            <a:endParaRPr lang="en-US" sz="2800" dirty="0">
+              <a:solidFill>
+                <a:srgbClr val="CCCCCC"/>
+              </a:solidFill>
+              <a:latin typeface="Consolas" panose="020B0609020204030204" pitchFamily="49" charset="0"/>
+            </a:endParaRPr>
+          </a:p>
+          <a:p>
+            <a:pPr marL="457200" indent="-457200" algn="l">
+              <a:buFont typeface="Arial" panose="020B0604020202020204" pitchFamily="34" charset="0"/>
+              <a:buChar char="•"/>
+            </a:pPr>
+            <a:endParaRPr lang="en-US" sz="2800" b="0" dirty="0">
+              <a:solidFill>
+                <a:srgbClr val="CCCCCC"/>
+              </a:solidFill>
+              <a:effectLst/>
+              <a:latin typeface="Consolas" panose="020B0609020204030204" pitchFamily="49" charset="0"/>
+            </a:endParaRPr>
+          </a:p>
+          <a:p>
+            <a:pPr marL="457200" indent="-457200" algn="l">
+              <a:buFont typeface="Arial" panose="020B0604020202020204" pitchFamily="34" charset="0"/>
+              <a:buChar char="•"/>
+            </a:pPr>
+            <a:endParaRPr lang="en-US" sz="2800" dirty="0">
+              <a:solidFill>
+                <a:srgbClr val="CCCCCC"/>
+              </a:solidFill>
+              <a:latin typeface="Consolas" panose="020B0609020204030204" pitchFamily="49" charset="0"/>
+            </a:endParaRPr>
+          </a:p>
+          <a:p>
+            <a:pPr algn="r"/>
+            <a:endParaRPr lang="en-US" sz="2800" b="0" dirty="0">
+              <a:solidFill>
+                <a:srgbClr val="CCCCCC"/>
+              </a:solidFill>
+              <a:effectLst/>
+              <a:latin typeface="Consolas" panose="020B0609020204030204" pitchFamily="49" charset="0"/>
+            </a:endParaRPr>
           </a:p>
         </p:txBody>
       </p:sp>
@@ -19915,23 +21071,12 @@
 </file>
 
 <file path=customXml/item1.xml><?xml version="1.0" encoding="utf-8"?>
-<p:properties xmlns:p="http://schemas.microsoft.com/office/2006/metadata/properties" xmlns:xsi="http://www.w3.org/2001/XMLSchema-instance" xmlns:pc="http://schemas.microsoft.com/office/infopath/2007/PartnerControls">
-  <documentManagement>
-    <_ip_UnifiedCompliancePolicyUIAction xmlns="http://schemas.microsoft.com/sharepoint/v3" xsi:nil="true"/>
-    <Image xmlns="71af3243-3dd4-4a8d-8c0d-dd76da1f02a5">
-      <Url xsi:nil="true"/>
-      <Description xsi:nil="true"/>
-    </Image>
-    <Status xmlns="71af3243-3dd4-4a8d-8c0d-dd76da1f02a5">Not started</Status>
-    <Background xmlns="71af3243-3dd4-4a8d-8c0d-dd76da1f02a5">false</Background>
-    <_ip_UnifiedCompliancePolicyProperties xmlns="http://schemas.microsoft.com/sharepoint/v3" xsi:nil="true"/>
-    <ImageTagsTaxHTField xmlns="71af3243-3dd4-4a8d-8c0d-dd76da1f02a5">
-      <Terms xmlns="http://schemas.microsoft.com/office/infopath/2007/PartnerControls"/>
-    </ImageTagsTaxHTField>
-    <TaxCatchAll xmlns="230e9df3-be65-4c73-a93b-d1236ebd677e" xsi:nil="true"/>
-    <MediaServiceKeyPoints xmlns="71af3243-3dd4-4a8d-8c0d-dd76da1f02a5" xsi:nil="true"/>
-  </documentManagement>
-</p:properties>
+<?mso-contentType ?>
+<FormTemplates xmlns="http://schemas.microsoft.com/sharepoint/v3/contenttype/forms">
+  <Display>DocumentLibraryForm</Display>
+  <Edit>DocumentLibraryForm</Edit>
+  <New>DocumentLibraryForm</New>
+</FormTemplates>
 </file>
 
 <file path=customXml/item2.xml><?xml version="1.0" encoding="utf-8"?>
@@ -20229,22 +21374,29 @@
 </file>
 
 <file path=customXml/item3.xml><?xml version="1.0" encoding="utf-8"?>
-<?mso-contentType ?>
-<FormTemplates xmlns="http://schemas.microsoft.com/sharepoint/v3/contenttype/forms">
-  <Display>DocumentLibraryForm</Display>
-  <Edit>DocumentLibraryForm</Edit>
-  <New>DocumentLibraryForm</New>
-</FormTemplates>
+<p:properties xmlns:p="http://schemas.microsoft.com/office/2006/metadata/properties" xmlns:xsi="http://www.w3.org/2001/XMLSchema-instance" xmlns:pc="http://schemas.microsoft.com/office/infopath/2007/PartnerControls">
+  <documentManagement>
+    <_ip_UnifiedCompliancePolicyUIAction xmlns="http://schemas.microsoft.com/sharepoint/v3" xsi:nil="true"/>
+    <Image xmlns="71af3243-3dd4-4a8d-8c0d-dd76da1f02a5">
+      <Url xsi:nil="true"/>
+      <Description xsi:nil="true"/>
+    </Image>
+    <Status xmlns="71af3243-3dd4-4a8d-8c0d-dd76da1f02a5">Not started</Status>
+    <Background xmlns="71af3243-3dd4-4a8d-8c0d-dd76da1f02a5">false</Background>
+    <_ip_UnifiedCompliancePolicyProperties xmlns="http://schemas.microsoft.com/sharepoint/v3" xsi:nil="true"/>
+    <ImageTagsTaxHTField xmlns="71af3243-3dd4-4a8d-8c0d-dd76da1f02a5">
+      <Terms xmlns="http://schemas.microsoft.com/office/infopath/2007/PartnerControls"/>
+    </ImageTagsTaxHTField>
+    <TaxCatchAll xmlns="230e9df3-be65-4c73-a93b-d1236ebd677e" xsi:nil="true"/>
+    <MediaServiceKeyPoints xmlns="71af3243-3dd4-4a8d-8c0d-dd76da1f02a5" xsi:nil="true"/>
+  </documentManagement>
+</p:properties>
 </file>
 
 <file path=customXml/itemProps1.xml><?xml version="1.0" encoding="utf-8"?>
-<ds:datastoreItem xmlns:ds="http://schemas.openxmlformats.org/officeDocument/2006/customXml" ds:itemID="{F8B8ECF1-2A9D-464C-AFE8-2B3295D0BF97}">
+<ds:datastoreItem xmlns:ds="http://schemas.openxmlformats.org/officeDocument/2006/customXml" ds:itemID="{4F1F1912-3146-44AF-A389-9E8B77BB3688}">
   <ds:schemaRefs>
-    <ds:schemaRef ds:uri="http://schemas.microsoft.com/office/2006/metadata/properties"/>
-    <ds:schemaRef ds:uri="http://schemas.microsoft.com/office/infopath/2007/PartnerControls"/>
-    <ds:schemaRef ds:uri="http://schemas.microsoft.com/sharepoint/v3"/>
-    <ds:schemaRef ds:uri="71af3243-3dd4-4a8d-8c0d-dd76da1f02a5"/>
-    <ds:schemaRef ds:uri="230e9df3-be65-4c73-a93b-d1236ebd677e"/>
+    <ds:schemaRef ds:uri="http://schemas.microsoft.com/sharepoint/v3/contenttype/forms"/>
   </ds:schemaRefs>
 </ds:datastoreItem>
 </file>
@@ -20271,9 +21423,13 @@
 </file>
 
 <file path=customXml/itemProps3.xml><?xml version="1.0" encoding="utf-8"?>
-<ds:datastoreItem xmlns:ds="http://schemas.openxmlformats.org/officeDocument/2006/customXml" ds:itemID="{4F1F1912-3146-44AF-A389-9E8B77BB3688}">
+<ds:datastoreItem xmlns:ds="http://schemas.openxmlformats.org/officeDocument/2006/customXml" ds:itemID="{F8B8ECF1-2A9D-464C-AFE8-2B3295D0BF97}">
   <ds:schemaRefs>
-    <ds:schemaRef ds:uri="http://schemas.microsoft.com/sharepoint/v3/contenttype/forms"/>
+    <ds:schemaRef ds:uri="http://schemas.microsoft.com/office/2006/metadata/properties"/>
+    <ds:schemaRef ds:uri="http://schemas.microsoft.com/office/infopath/2007/PartnerControls"/>
+    <ds:schemaRef ds:uri="http://schemas.microsoft.com/sharepoint/v3"/>
+    <ds:schemaRef ds:uri="71af3243-3dd4-4a8d-8c0d-dd76da1f02a5"/>
+    <ds:schemaRef ds:uri="230e9df3-be65-4c73-a93b-d1236ebd677e"/>
   </ds:schemaRefs>
 </ds:datastoreItem>
 </file>

</xml_diff>